<commit_message>
feat(chart): modifiy cahrt series datalabel solidFill color
</commit_message>
<xml_diff>
--- a/__tests__/pptx-templates/ChartLinesVertical.pptx
+++ b/__tests__/pptx-templates/ChartLinesVertical.pptx
@@ -267,6 +267,62 @@
               <a:effectLst/>
             </c:spPr>
           </c:marker>
+          <c:dLbls>
+            <c:spPr>
+              <a:solidFill>
+                <a:srgbClr val="0070C0"/>
+              </a:solidFill>
+              <a:ln>
+                <a:noFill/>
+              </a:ln>
+              <a:effectLst/>
+            </c:spPr>
+            <c:txPr>
+              <a:bodyPr rot="0" spcFirstLastPara="1" vertOverflow="ellipsis" vert="horz" wrap="square" lIns="38100" tIns="19050" rIns="38100" bIns="19050" anchor="ctr" anchorCtr="1">
+                <a:spAutoFit/>
+              </a:bodyPr>
+              <a:lstStyle/>
+              <a:p>
+                <a:pPr>
+                  <a:defRPr sz="1197" b="0" i="0" u="none" strike="noStrike" kern="1200" baseline="0">
+                    <a:solidFill>
+                      <a:schemeClr val="bg1"/>
+                    </a:solidFill>
+                    <a:latin typeface="+mn-lt"/>
+                    <a:ea typeface="+mn-ea"/>
+                    <a:cs typeface="+mn-cs"/>
+                  </a:defRPr>
+                </a:pPr>
+                <a:endParaRPr lang="de-DE"/>
+              </a:p>
+            </c:txPr>
+            <c:showLegendKey val="0"/>
+            <c:showVal val="0"/>
+            <c:showCatName val="1"/>
+            <c:showSerName val="0"/>
+            <c:showPercent val="0"/>
+            <c:showBubbleSize val="0"/>
+            <c:showLeaderLines val="0"/>
+            <c:extLst>
+              <c:ext xmlns:c15="http://schemas.microsoft.com/office/drawing/2012/chart" uri="{CE6537A1-D6FC-4f65-9D91-7224C49458BB}">
+                <c15:showLeaderLines val="1"/>
+                <c15:leaderLines>
+                  <c:spPr>
+                    <a:ln w="9525" cap="flat" cmpd="sng" algn="ctr">
+                      <a:solidFill>
+                        <a:schemeClr val="tx1">
+                          <a:lumMod val="35000"/>
+                          <a:lumOff val="65000"/>
+                        </a:schemeClr>
+                      </a:solidFill>
+                      <a:round/>
+                    </a:ln>
+                    <a:effectLst/>
+                  </c:spPr>
+                </c15:leaderLines>
+              </c:ext>
+            </c:extLst>
+          </c:dLbls>
           <c:xVal>
             <c:numRef>
               <c:f>Tabelle1!$D$2:$D$6</c:f>
@@ -1183,7 +1239,7 @@
           <a:p>
             <a:fld id="{8FB60A0F-5ED1-45ED-A5D5-DB038E6B70D9}" type="datetimeFigureOut">
               <a:rPr lang="de-DE" smtClean="0"/>
-              <a:t>25.03.2021</a:t>
+              <a:t>18.12.2024</a:t>
             </a:fld>
             <a:endParaRPr lang="de-DE"/>
           </a:p>
@@ -1381,7 +1437,7 @@
           <a:p>
             <a:fld id="{8FB60A0F-5ED1-45ED-A5D5-DB038E6B70D9}" type="datetimeFigureOut">
               <a:rPr lang="de-DE" smtClean="0"/>
-              <a:t>25.03.2021</a:t>
+              <a:t>18.12.2024</a:t>
             </a:fld>
             <a:endParaRPr lang="de-DE"/>
           </a:p>
@@ -1589,7 +1645,7 @@
           <a:p>
             <a:fld id="{8FB60A0F-5ED1-45ED-A5D5-DB038E6B70D9}" type="datetimeFigureOut">
               <a:rPr lang="de-DE" smtClean="0"/>
-              <a:t>25.03.2021</a:t>
+              <a:t>18.12.2024</a:t>
             </a:fld>
             <a:endParaRPr lang="de-DE"/>
           </a:p>
@@ -1787,7 +1843,7 @@
           <a:p>
             <a:fld id="{8FB60A0F-5ED1-45ED-A5D5-DB038E6B70D9}" type="datetimeFigureOut">
               <a:rPr lang="de-DE" smtClean="0"/>
-              <a:t>25.03.2021</a:t>
+              <a:t>18.12.2024</a:t>
             </a:fld>
             <a:endParaRPr lang="de-DE"/>
           </a:p>
@@ -2062,7 +2118,7 @@
           <a:p>
             <a:fld id="{8FB60A0F-5ED1-45ED-A5D5-DB038E6B70D9}" type="datetimeFigureOut">
               <a:rPr lang="de-DE" smtClean="0"/>
-              <a:t>25.03.2021</a:t>
+              <a:t>18.12.2024</a:t>
             </a:fld>
             <a:endParaRPr lang="de-DE"/>
           </a:p>
@@ -2327,7 +2383,7 @@
           <a:p>
             <a:fld id="{8FB60A0F-5ED1-45ED-A5D5-DB038E6B70D9}" type="datetimeFigureOut">
               <a:rPr lang="de-DE" smtClean="0"/>
-              <a:t>25.03.2021</a:t>
+              <a:t>18.12.2024</a:t>
             </a:fld>
             <a:endParaRPr lang="de-DE"/>
           </a:p>
@@ -2739,7 +2795,7 @@
           <a:p>
             <a:fld id="{8FB60A0F-5ED1-45ED-A5D5-DB038E6B70D9}" type="datetimeFigureOut">
               <a:rPr lang="de-DE" smtClean="0"/>
-              <a:t>25.03.2021</a:t>
+              <a:t>18.12.2024</a:t>
             </a:fld>
             <a:endParaRPr lang="de-DE"/>
           </a:p>
@@ -2880,7 +2936,7 @@
           <a:p>
             <a:fld id="{8FB60A0F-5ED1-45ED-A5D5-DB038E6B70D9}" type="datetimeFigureOut">
               <a:rPr lang="de-DE" smtClean="0"/>
-              <a:t>25.03.2021</a:t>
+              <a:t>18.12.2024</a:t>
             </a:fld>
             <a:endParaRPr lang="de-DE"/>
           </a:p>
@@ -2993,7 +3049,7 @@
           <a:p>
             <a:fld id="{8FB60A0F-5ED1-45ED-A5D5-DB038E6B70D9}" type="datetimeFigureOut">
               <a:rPr lang="de-DE" smtClean="0"/>
-              <a:t>25.03.2021</a:t>
+              <a:t>18.12.2024</a:t>
             </a:fld>
             <a:endParaRPr lang="de-DE"/>
           </a:p>
@@ -3304,7 +3360,7 @@
           <a:p>
             <a:fld id="{8FB60A0F-5ED1-45ED-A5D5-DB038E6B70D9}" type="datetimeFigureOut">
               <a:rPr lang="de-DE" smtClean="0"/>
-              <a:t>25.03.2021</a:t>
+              <a:t>18.12.2024</a:t>
             </a:fld>
             <a:endParaRPr lang="de-DE"/>
           </a:p>
@@ -3592,7 +3648,7 @@
           <a:p>
             <a:fld id="{8FB60A0F-5ED1-45ED-A5D5-DB038E6B70D9}" type="datetimeFigureOut">
               <a:rPr lang="de-DE" smtClean="0"/>
-              <a:t>25.03.2021</a:t>
+              <a:t>18.12.2024</a:t>
             </a:fld>
             <a:endParaRPr lang="de-DE"/>
           </a:p>
@@ -3833,7 +3889,7 @@
           <a:p>
             <a:fld id="{8FB60A0F-5ED1-45ED-A5D5-DB038E6B70D9}" type="datetimeFigureOut">
               <a:rPr lang="de-DE" smtClean="0"/>
-              <a:t>25.03.2021</a:t>
+              <a:t>18.12.2024</a:t>
             </a:fld>
             <a:endParaRPr lang="de-DE"/>
           </a:p>
@@ -4263,7 +4319,7 @@
           <p:nvPr>
             <p:extLst>
               <p:ext uri="{D42A27DB-BD31-4B8C-83A1-F6EECF244321}">
-                <p14:modId xmlns:p14="http://schemas.microsoft.com/office/powerpoint/2010/main" val="1483504639"/>
+                <p14:modId xmlns:p14="http://schemas.microsoft.com/office/powerpoint/2010/main" val="242323069"/>
               </p:ext>
             </p:extLst>
           </p:nvPr>

</xml_diff>